<commit_message>
PR mise à jour correcte de l'algo
</commit_message>
<xml_diff>
--- a/60 - Simulator/session SLAM v0.05.pptx
+++ b/60 - Simulator/session SLAM v0.05.pptx
@@ -25,11 +25,12 @@
     <p:sldId id="276" r:id="rId19"/>
     <p:sldId id="277" r:id="rId20"/>
     <p:sldId id="279" r:id="rId21"/>
-    <p:sldId id="272" r:id="rId22"/>
-    <p:sldId id="270" r:id="rId23"/>
-    <p:sldId id="273" r:id="rId24"/>
-    <p:sldId id="280" r:id="rId25"/>
-    <p:sldId id="281" r:id="rId26"/>
+    <p:sldId id="284" r:id="rId22"/>
+    <p:sldId id="272" r:id="rId23"/>
+    <p:sldId id="270" r:id="rId24"/>
+    <p:sldId id="273" r:id="rId25"/>
+    <p:sldId id="280" r:id="rId26"/>
+    <p:sldId id="281" r:id="rId27"/>
   </p:sldIdLst>
   <p:sldSz cx="9144000" cy="6858000" type="screen4x3"/>
   <p:notesSz cx="6858000" cy="9144000"/>
@@ -327,7 +328,7 @@
             <a:fld id="{1D8BD707-D9CF-40AE-B4C6-C98DA3205C09}" type="datetimeFigureOut">
               <a:rPr lang="en-US" smtClean="0"/>
               <a:pPr/>
-              <a:t>10/25/2019</a:t>
+              <a:t>10/26/2019</a:t>
             </a:fld>
             <a:endParaRPr lang="en-US"/>
           </a:p>
@@ -492,7 +493,7 @@
             <a:fld id="{1D8BD707-D9CF-40AE-B4C6-C98DA3205C09}" type="datetimeFigureOut">
               <a:rPr lang="en-US" smtClean="0"/>
               <a:pPr/>
-              <a:t>10/25/2019</a:t>
+              <a:t>10/26/2019</a:t>
             </a:fld>
             <a:endParaRPr lang="en-US"/>
           </a:p>
@@ -667,7 +668,7 @@
             <a:fld id="{1D8BD707-D9CF-40AE-B4C6-C98DA3205C09}" type="datetimeFigureOut">
               <a:rPr lang="en-US" smtClean="0"/>
               <a:pPr/>
-              <a:t>10/25/2019</a:t>
+              <a:t>10/26/2019</a:t>
             </a:fld>
             <a:endParaRPr lang="en-US"/>
           </a:p>
@@ -832,7 +833,7 @@
             <a:fld id="{1D8BD707-D9CF-40AE-B4C6-C98DA3205C09}" type="datetimeFigureOut">
               <a:rPr lang="en-US" smtClean="0"/>
               <a:pPr/>
-              <a:t>10/25/2019</a:t>
+              <a:t>10/26/2019</a:t>
             </a:fld>
             <a:endParaRPr lang="en-US"/>
           </a:p>
@@ -1074,7 +1075,7 @@
             <a:fld id="{1D8BD707-D9CF-40AE-B4C6-C98DA3205C09}" type="datetimeFigureOut">
               <a:rPr lang="en-US" smtClean="0"/>
               <a:pPr/>
-              <a:t>10/25/2019</a:t>
+              <a:t>10/26/2019</a:t>
             </a:fld>
             <a:endParaRPr lang="en-US"/>
           </a:p>
@@ -1356,7 +1357,7 @@
             <a:fld id="{1D8BD707-D9CF-40AE-B4C6-C98DA3205C09}" type="datetimeFigureOut">
               <a:rPr lang="en-US" smtClean="0"/>
               <a:pPr/>
-              <a:t>10/25/2019</a:t>
+              <a:t>10/26/2019</a:t>
             </a:fld>
             <a:endParaRPr lang="en-US"/>
           </a:p>
@@ -1772,7 +1773,7 @@
             <a:fld id="{1D8BD707-D9CF-40AE-B4C6-C98DA3205C09}" type="datetimeFigureOut">
               <a:rPr lang="en-US" smtClean="0"/>
               <a:pPr/>
-              <a:t>10/25/2019</a:t>
+              <a:t>10/26/2019</a:t>
             </a:fld>
             <a:endParaRPr lang="en-US"/>
           </a:p>
@@ -1886,7 +1887,7 @@
             <a:fld id="{1D8BD707-D9CF-40AE-B4C6-C98DA3205C09}" type="datetimeFigureOut">
               <a:rPr lang="en-US" smtClean="0"/>
               <a:pPr/>
-              <a:t>10/25/2019</a:t>
+              <a:t>10/26/2019</a:t>
             </a:fld>
             <a:endParaRPr lang="en-US"/>
           </a:p>
@@ -1978,7 +1979,7 @@
             <a:fld id="{1D8BD707-D9CF-40AE-B4C6-C98DA3205C09}" type="datetimeFigureOut">
               <a:rPr lang="en-US" smtClean="0"/>
               <a:pPr/>
-              <a:t>10/25/2019</a:t>
+              <a:t>10/26/2019</a:t>
             </a:fld>
             <a:endParaRPr lang="en-US"/>
           </a:p>
@@ -2250,7 +2251,7 @@
             <a:fld id="{1D8BD707-D9CF-40AE-B4C6-C98DA3205C09}" type="datetimeFigureOut">
               <a:rPr lang="en-US" smtClean="0"/>
               <a:pPr/>
-              <a:t>10/25/2019</a:t>
+              <a:t>10/26/2019</a:t>
             </a:fld>
             <a:endParaRPr lang="en-US"/>
           </a:p>
@@ -2499,7 +2500,7 @@
             <a:fld id="{1D8BD707-D9CF-40AE-B4C6-C98DA3205C09}" type="datetimeFigureOut">
               <a:rPr lang="en-US" smtClean="0"/>
               <a:pPr/>
-              <a:t>10/25/2019</a:t>
+              <a:t>10/26/2019</a:t>
             </a:fld>
             <a:endParaRPr lang="en-US"/>
           </a:p>
@@ -2707,7 +2708,7 @@
             <a:fld id="{1D8BD707-D9CF-40AE-B4C6-C98DA3205C09}" type="datetimeFigureOut">
               <a:rPr lang="en-US" smtClean="0"/>
               <a:pPr/>
-              <a:t>10/25/2019</a:t>
+              <a:t>10/26/2019</a:t>
             </a:fld>
             <a:endParaRPr lang="en-US"/>
           </a:p>
@@ -5190,10 +5191,9 @@
           <a:lstStyle/>
           <a:p>
             <a:r>
-              <a:rPr lang="fr-FR"/>
+              <a:rPr lang="fr-FR" dirty="0"/>
               <a:t>Algorithme SLAM « maison »</a:t>
             </a:r>
-            <a:endParaRPr lang="fr-FR" dirty="0"/>
           </a:p>
         </p:txBody>
       </p:sp>
@@ -5343,7 +5343,13 @@
       </p:grpSpPr>
       <p:sp>
         <p:nvSpPr>
-          <p:cNvPr id="2" name="Titre 1"/>
+          <p:cNvPr id="2" name="Titre 1">
+            <a:extLst>
+              <a:ext uri="{FF2B5EF4-FFF2-40B4-BE49-F238E27FC236}">
+                <a16:creationId xmlns:a16="http://schemas.microsoft.com/office/drawing/2014/main" id="{1AC18A72-3633-44BC-9268-BA6148FA80F1}"/>
+              </a:ext>
+            </a:extLst>
+          </p:cNvPr>
           <p:cNvSpPr>
             <a:spLocks noGrp="1"/>
           </p:cNvSpPr>
@@ -5365,7 +5371,13 @@
       </p:sp>
       <p:sp>
         <p:nvSpPr>
-          <p:cNvPr id="3" name="Espace réservé du contenu 2"/>
+          <p:cNvPr id="3" name="Espace réservé du contenu 2">
+            <a:extLst>
+              <a:ext uri="{FF2B5EF4-FFF2-40B4-BE49-F238E27FC236}">
+                <a16:creationId xmlns:a16="http://schemas.microsoft.com/office/drawing/2014/main" id="{68EC7013-92F8-4C4D-BEB6-2F350BB182E9}"/>
+              </a:ext>
+            </a:extLst>
+          </p:cNvPr>
           <p:cNvSpPr>
             <a:spLocks noGrp="1"/>
           </p:cNvSpPr>
@@ -5375,180 +5387,47 @@
         </p:nvSpPr>
         <p:spPr/>
         <p:txBody>
-          <a:bodyPr>
-            <a:normAutofit fontScale="70000" lnSpcReduction="20000"/>
-          </a:bodyPr>
-          <a:lstStyle/>
-          <a:p>
-            <a:r>
-              <a:rPr lang="fr-FR" dirty="0"/>
-              <a:t>Limitations  &amp; Problèmes</a:t>
-            </a:r>
-          </a:p>
-          <a:p>
-            <a:pPr lvl="1"/>
-            <a:r>
-              <a:rPr lang="fr-FR" dirty="0"/>
-              <a:t>Correction de la translation seulement (</a:t>
-            </a:r>
-            <a:r>
-              <a:rPr lang="fr-FR" dirty="0" err="1"/>
-              <a:t>x,y</a:t>
-            </a:r>
-            <a:r>
-              <a:rPr lang="fr-FR" dirty="0"/>
-              <a:t>)</a:t>
-            </a:r>
-          </a:p>
-          <a:p>
-            <a:pPr lvl="1"/>
-            <a:r>
-              <a:rPr lang="fr-FR" dirty="0"/>
-              <a:t>Pas d’algorithme de fermeture de boucle </a:t>
-            </a:r>
-          </a:p>
-          <a:p>
-            <a:pPr lvl="1"/>
-            <a:r>
-              <a:rPr lang="fr-FR" dirty="0">
-                <a:solidFill>
-                  <a:srgbClr val="FF0000"/>
-                </a:solidFill>
-              </a:rPr>
-              <a:t>Fermeture de boucle avec bruit (</a:t>
-            </a:r>
-            <a:r>
-              <a:rPr lang="fr-FR" dirty="0" err="1">
-                <a:solidFill>
-                  <a:srgbClr val="FF0000"/>
-                </a:solidFill>
-              </a:rPr>
-              <a:t>v,w</a:t>
-            </a:r>
-            <a:r>
-              <a:rPr lang="fr-FR" dirty="0">
-                <a:solidFill>
-                  <a:srgbClr val="FF0000"/>
-                </a:solidFill>
-              </a:rPr>
-              <a:t>)</a:t>
-            </a:r>
-          </a:p>
-          <a:p>
-            <a:pPr lvl="1"/>
-            <a:r>
-              <a:rPr lang="fr-FR" dirty="0"/>
-              <a:t>Temps de calcul </a:t>
-            </a:r>
-            <a:r>
-              <a:rPr lang="fr-FR" dirty="0">
-                <a:sym typeface="Wingdings" panose="05000000000000000000" pitchFamily="2" charset="2"/>
-              </a:rPr>
-              <a:t> VECTORISER/SIMPLIFIER</a:t>
-            </a:r>
-          </a:p>
-          <a:p>
-            <a:pPr lvl="1"/>
-            <a:endParaRPr lang="fr-FR" dirty="0"/>
-          </a:p>
-          <a:p>
-            <a:r>
-              <a:rPr lang="fr-FR" dirty="0"/>
-              <a:t>Améliorations :</a:t>
-            </a:r>
-          </a:p>
-          <a:p>
-            <a:pPr lvl="1"/>
-            <a:r>
-              <a:rPr lang="fr-FR" dirty="0"/>
-              <a:t>Faire ce qui est présenté ! </a:t>
-            </a:r>
-            <a:r>
-              <a:rPr lang="fr-FR" dirty="0">
-                <a:sym typeface="Wingdings" panose="05000000000000000000" pitchFamily="2" charset="2"/>
-              </a:rPr>
-              <a:t></a:t>
-            </a:r>
-          </a:p>
-          <a:p>
-            <a:pPr lvl="1"/>
-            <a:r>
-              <a:rPr lang="fr-FR" dirty="0"/>
-              <a:t>Ajouter la corriger du cap en 4-5-6</a:t>
-            </a:r>
-          </a:p>
-          <a:p>
-            <a:pPr lvl="1"/>
-            <a:r>
-              <a:rPr lang="fr-FR" dirty="0"/>
-              <a:t>Ajouter une fermeture de boucle </a:t>
-            </a:r>
-          </a:p>
-          <a:p>
-            <a:pPr lvl="2"/>
-            <a:r>
-              <a:rPr lang="fr-FR" dirty="0"/>
-              <a:t>Détection de la fermeture de boucle (</a:t>
-            </a:r>
-            <a:r>
-              <a:rPr lang="fr-FR" dirty="0" err="1"/>
-              <a:t>x,y,h</a:t>
-            </a:r>
-            <a:r>
-              <a:rPr lang="fr-FR" dirty="0"/>
-              <a:t>)t1 == (</a:t>
-            </a:r>
-            <a:r>
-              <a:rPr lang="fr-FR" dirty="0" err="1"/>
-              <a:t>x,y,h</a:t>
-            </a:r>
-            <a:r>
-              <a:rPr lang="fr-FR" dirty="0"/>
-              <a:t>)t2, t1&lt;&gt;t2</a:t>
-            </a:r>
-          </a:p>
-          <a:p>
-            <a:pPr lvl="2"/>
-            <a:r>
-              <a:rPr lang="fr-FR" dirty="0"/>
-              <a:t>Scruter l’évolution de la carte suite à la fermeture </a:t>
-            </a:r>
-            <a:r>
-              <a:rPr lang="fr-FR" dirty="0">
-                <a:sym typeface="Wingdings" panose="05000000000000000000" pitchFamily="2" charset="2"/>
-              </a:rPr>
-              <a:t> détection d’anomalie</a:t>
-            </a:r>
-            <a:endParaRPr lang="fr-FR" dirty="0"/>
-          </a:p>
-          <a:p>
-            <a:pPr lvl="1"/>
-            <a:r>
-              <a:rPr lang="fr-FR" dirty="0"/>
-              <a:t>Réjection des obstacles fugitifs / mobiles</a:t>
-            </a:r>
-          </a:p>
-          <a:p>
-            <a:pPr lvl="2"/>
-            <a:r>
-              <a:rPr lang="fr-FR" dirty="0"/>
-              <a:t>Estimation de la fiabilité et/ou de l’espérance de vie des ‘</a:t>
-            </a:r>
-            <a:r>
-              <a:rPr lang="fr-FR" dirty="0" err="1"/>
-              <a:t>landmarks</a:t>
-            </a:r>
-            <a:r>
-              <a:rPr lang="fr-FR" dirty="0"/>
-              <a:t>’</a:t>
-            </a:r>
-          </a:p>
-        </p:txBody>
-      </p:sp>
+          <a:bodyPr/>
+          <a:lstStyle/>
+          <a:p>
+            <a:endParaRPr lang="fr-FR"/>
+          </a:p>
+        </p:txBody>
+      </p:sp>
+      <p:pic>
+        <p:nvPicPr>
+          <p:cNvPr id="4" name="Image 3">
+            <a:extLst>
+              <a:ext uri="{FF2B5EF4-FFF2-40B4-BE49-F238E27FC236}">
+                <a16:creationId xmlns:a16="http://schemas.microsoft.com/office/drawing/2014/main" id="{E632ED82-6C53-4886-B66E-9E13657D9D42}"/>
+              </a:ext>
+            </a:extLst>
+          </p:cNvPr>
+          <p:cNvPicPr>
+            <a:picLocks noChangeAspect="1"/>
+          </p:cNvPicPr>
+          <p:nvPr/>
+        </p:nvPicPr>
+        <p:blipFill>
+          <a:blip r:embed="rId2"/>
+          <a:stretch>
+            <a:fillRect/>
+          </a:stretch>
+        </p:blipFill>
+        <p:spPr>
+          <a:xfrm>
+            <a:off x="0" y="1604962"/>
+            <a:ext cx="9144000" cy="5253038"/>
+          </a:xfrm>
+          <a:prstGeom prst="rect">
+            <a:avLst/>
+          </a:prstGeom>
+        </p:spPr>
+      </p:pic>
     </p:spTree>
     <p:extLst>
       <p:ext uri="{BB962C8B-B14F-4D97-AF65-F5344CB8AC3E}">
-        <p14:creationId xmlns:p14="http://schemas.microsoft.com/office/powerpoint/2010/main" val="3761765850"/>
+        <p14:creationId xmlns:p14="http://schemas.microsoft.com/office/powerpoint/2010/main" val="1342233133"/>
       </p:ext>
     </p:extLst>
   </p:cSld>
@@ -5582,39 +5461,199 @@
             <a:spLocks noGrp="1"/>
           </p:cNvSpPr>
           <p:nvPr>
-            <p:ph type="ctrTitle"/>
-          </p:nvPr>
-        </p:nvSpPr>
-        <p:spPr/>
-        <p:txBody>
-          <a:bodyPr/>
-          <a:lstStyle/>
-          <a:p>
-            <a:r>
-              <a:rPr lang="fr-FR" dirty="0"/>
-              <a:t>SLAM</a:t>
-            </a:r>
-          </a:p>
-        </p:txBody>
-      </p:sp>
-      <p:sp>
-        <p:nvSpPr>
-          <p:cNvPr id="3" name="Sous-titre 2"/>
-          <p:cNvSpPr>
-            <a:spLocks noGrp="1"/>
-          </p:cNvSpPr>
-          <p:nvPr>
-            <p:ph type="subTitle" idx="1"/>
-          </p:nvPr>
-        </p:nvSpPr>
-        <p:spPr/>
-        <p:txBody>
-          <a:bodyPr/>
-          <a:lstStyle/>
-          <a:p>
-            <a:r>
-              <a:rPr lang="fr-FR" dirty="0"/>
-              <a:t>Solution &amp; Portage ROBOT</a:t>
+            <p:ph type="title"/>
+          </p:nvPr>
+        </p:nvSpPr>
+        <p:spPr/>
+        <p:txBody>
+          <a:bodyPr/>
+          <a:lstStyle/>
+          <a:p>
+            <a:r>
+              <a:rPr lang="fr-FR" dirty="0"/>
+              <a:t>Algorithme SLAM « maison »</a:t>
+            </a:r>
+          </a:p>
+        </p:txBody>
+      </p:sp>
+      <p:sp>
+        <p:nvSpPr>
+          <p:cNvPr id="3" name="Espace réservé du contenu 2"/>
+          <p:cNvSpPr>
+            <a:spLocks noGrp="1"/>
+          </p:cNvSpPr>
+          <p:nvPr>
+            <p:ph idx="1"/>
+          </p:nvPr>
+        </p:nvSpPr>
+        <p:spPr/>
+        <p:txBody>
+          <a:bodyPr>
+            <a:normAutofit fontScale="70000" lnSpcReduction="20000"/>
+          </a:bodyPr>
+          <a:lstStyle/>
+          <a:p>
+            <a:r>
+              <a:rPr lang="fr-FR" dirty="0"/>
+              <a:t>Limitations  &amp; Problèmes</a:t>
+            </a:r>
+          </a:p>
+          <a:p>
+            <a:pPr lvl="1"/>
+            <a:r>
+              <a:rPr lang="fr-FR" dirty="0"/>
+              <a:t>Correction de la translation seulement (</a:t>
+            </a:r>
+            <a:r>
+              <a:rPr lang="fr-FR" dirty="0" err="1"/>
+              <a:t>x,y</a:t>
+            </a:r>
+            <a:r>
+              <a:rPr lang="fr-FR" dirty="0"/>
+              <a:t>)</a:t>
+            </a:r>
+          </a:p>
+          <a:p>
+            <a:pPr lvl="1"/>
+            <a:r>
+              <a:rPr lang="fr-FR" dirty="0"/>
+              <a:t>Pas d’algorithme de fermeture de boucle </a:t>
+            </a:r>
+          </a:p>
+          <a:p>
+            <a:pPr lvl="1"/>
+            <a:r>
+              <a:rPr lang="fr-FR" dirty="0">
+                <a:solidFill>
+                  <a:srgbClr val="FF0000"/>
+                </a:solidFill>
+              </a:rPr>
+              <a:t>Fermeture de boucle avec bruit (</a:t>
+            </a:r>
+            <a:r>
+              <a:rPr lang="fr-FR" dirty="0" err="1">
+                <a:solidFill>
+                  <a:srgbClr val="FF0000"/>
+                </a:solidFill>
+              </a:rPr>
+              <a:t>v,w</a:t>
+            </a:r>
+            <a:r>
+              <a:rPr lang="fr-FR" dirty="0">
+                <a:solidFill>
+                  <a:srgbClr val="FF0000"/>
+                </a:solidFill>
+              </a:rPr>
+              <a:t>)</a:t>
+            </a:r>
+          </a:p>
+          <a:p>
+            <a:pPr lvl="1"/>
+            <a:r>
+              <a:rPr lang="fr-FR" dirty="0"/>
+              <a:t>Temps de calcul </a:t>
+            </a:r>
+            <a:r>
+              <a:rPr lang="fr-FR" dirty="0">
+                <a:sym typeface="Wingdings" panose="05000000000000000000" pitchFamily="2" charset="2"/>
+              </a:rPr>
+              <a:t> VECTORISER/SIMPLIFIER</a:t>
+            </a:r>
+          </a:p>
+          <a:p>
+            <a:pPr lvl="1"/>
+            <a:endParaRPr lang="fr-FR" dirty="0"/>
+          </a:p>
+          <a:p>
+            <a:r>
+              <a:rPr lang="fr-FR" dirty="0"/>
+              <a:t>Améliorations :</a:t>
+            </a:r>
+          </a:p>
+          <a:p>
+            <a:pPr lvl="1"/>
+            <a:r>
+              <a:rPr lang="fr-FR" dirty="0"/>
+              <a:t>Faire ce qui est présenté ! </a:t>
+            </a:r>
+            <a:r>
+              <a:rPr lang="fr-FR" dirty="0">
+                <a:sym typeface="Wingdings" panose="05000000000000000000" pitchFamily="2" charset="2"/>
+              </a:rPr>
+              <a:t></a:t>
+            </a:r>
+          </a:p>
+          <a:p>
+            <a:pPr lvl="1"/>
+            <a:r>
+              <a:rPr lang="fr-FR" dirty="0"/>
+              <a:t>Ajouter la corriger du cap en 4-5-6</a:t>
+            </a:r>
+          </a:p>
+          <a:p>
+            <a:pPr lvl="1"/>
+            <a:r>
+              <a:rPr lang="fr-FR" dirty="0"/>
+              <a:t>Ajouter une fermeture de boucle </a:t>
+            </a:r>
+          </a:p>
+          <a:p>
+            <a:pPr lvl="2"/>
+            <a:r>
+              <a:rPr lang="fr-FR" dirty="0"/>
+              <a:t>Détection de la fermeture de boucle (</a:t>
+            </a:r>
+            <a:r>
+              <a:rPr lang="fr-FR" dirty="0" err="1"/>
+              <a:t>x,y,h</a:t>
+            </a:r>
+            <a:r>
+              <a:rPr lang="fr-FR" dirty="0"/>
+              <a:t>)t1 == (</a:t>
+            </a:r>
+            <a:r>
+              <a:rPr lang="fr-FR" dirty="0" err="1"/>
+              <a:t>x,y,h</a:t>
+            </a:r>
+            <a:r>
+              <a:rPr lang="fr-FR" dirty="0"/>
+              <a:t>)t2, t1&lt;&gt;t2</a:t>
+            </a:r>
+          </a:p>
+          <a:p>
+            <a:pPr lvl="2"/>
+            <a:r>
+              <a:rPr lang="fr-FR" dirty="0"/>
+              <a:t>Scruter l’évolution de la carte suite à la fermeture </a:t>
+            </a:r>
+            <a:r>
+              <a:rPr lang="fr-FR" dirty="0">
+                <a:sym typeface="Wingdings" panose="05000000000000000000" pitchFamily="2" charset="2"/>
+              </a:rPr>
+              <a:t> détection d’anomalie</a:t>
+            </a:r>
+            <a:endParaRPr lang="fr-FR" dirty="0"/>
+          </a:p>
+          <a:p>
+            <a:pPr lvl="1"/>
+            <a:r>
+              <a:rPr lang="fr-FR" dirty="0"/>
+              <a:t>Réjection des obstacles fugitifs / mobiles</a:t>
+            </a:r>
+          </a:p>
+          <a:p>
+            <a:pPr lvl="2"/>
+            <a:r>
+              <a:rPr lang="fr-FR" dirty="0"/>
+              <a:t>Estimation de la fiabilité et/ou de l’espérance de vie des ‘</a:t>
+            </a:r>
+            <a:r>
+              <a:rPr lang="fr-FR" dirty="0" err="1"/>
+              <a:t>landmarks</a:t>
+            </a:r>
+            <a:r>
+              <a:rPr lang="fr-FR" dirty="0"/>
+              <a:t>’</a:t>
             </a:r>
           </a:p>
         </p:txBody>
@@ -5622,7 +5661,7 @@
     </p:spTree>
     <p:extLst>
       <p:ext uri="{BB962C8B-B14F-4D97-AF65-F5344CB8AC3E}">
-        <p14:creationId xmlns:p14="http://schemas.microsoft.com/office/powerpoint/2010/main" val="207348330"/>
+        <p14:creationId xmlns:p14="http://schemas.microsoft.com/office/powerpoint/2010/main" val="3761765850"/>
       </p:ext>
     </p:extLst>
   </p:cSld>
@@ -5656,7 +5695,7 @@
             <a:spLocks noGrp="1"/>
           </p:cNvSpPr>
           <p:nvPr>
-            <p:ph type="title"/>
+            <p:ph type="ctrTitle"/>
           </p:nvPr>
         </p:nvSpPr>
         <p:spPr/>
@@ -5673,56 +5712,22 @@
       </p:sp>
       <p:sp>
         <p:nvSpPr>
-          <p:cNvPr id="3" name="Espace réservé du contenu 2"/>
-          <p:cNvSpPr>
-            <a:spLocks noGrp="1"/>
-          </p:cNvSpPr>
-          <p:nvPr>
-            <p:ph idx="1"/>
-          </p:nvPr>
-        </p:nvSpPr>
-        <p:spPr/>
-        <p:txBody>
-          <a:bodyPr/>
-          <a:lstStyle/>
-          <a:p>
-            <a:r>
-              <a:rPr lang="fr-FR" dirty="0"/>
-              <a:t>EKF-SLAM (</a:t>
-            </a:r>
-            <a:r>
-              <a:rPr lang="fr-FR" dirty="0" err="1"/>
-              <a:t>Kalman</a:t>
-            </a:r>
-            <a:r>
-              <a:rPr lang="fr-FR" dirty="0"/>
-              <a:t> </a:t>
-            </a:r>
-            <a:r>
-              <a:rPr lang="fr-FR" dirty="0" err="1"/>
-              <a:t>Filter</a:t>
-            </a:r>
-            <a:r>
-              <a:rPr lang="fr-FR" dirty="0"/>
-              <a:t>)</a:t>
-            </a:r>
-          </a:p>
-          <a:p>
-            <a:r>
-              <a:rPr lang="fr-FR" dirty="0"/>
-              <a:t>FAST-SLAM 1,0 et 2,0 (particules)</a:t>
-            </a:r>
-          </a:p>
-          <a:p>
-            <a:r>
-              <a:rPr lang="fr-FR" dirty="0"/>
-              <a:t>Optical-SLAM…</a:t>
-            </a:r>
-          </a:p>
-          <a:p>
-            <a:r>
-              <a:rPr lang="fr-FR" dirty="0"/>
-              <a:t>Autres ?</a:t>
+          <p:cNvPr id="3" name="Sous-titre 2"/>
+          <p:cNvSpPr>
+            <a:spLocks noGrp="1"/>
+          </p:cNvSpPr>
+          <p:nvPr>
+            <p:ph type="subTitle" idx="1"/>
+          </p:nvPr>
+        </p:nvSpPr>
+        <p:spPr/>
+        <p:txBody>
+          <a:bodyPr/>
+          <a:lstStyle/>
+          <a:p>
+            <a:r>
+              <a:rPr lang="fr-FR" dirty="0"/>
+              <a:t>Solution &amp; Portage ROBOT</a:t>
             </a:r>
           </a:p>
         </p:txBody>
@@ -5730,7 +5735,7 @@
     </p:spTree>
     <p:extLst>
       <p:ext uri="{BB962C8B-B14F-4D97-AF65-F5344CB8AC3E}">
-        <p14:creationId xmlns:p14="http://schemas.microsoft.com/office/powerpoint/2010/main" val="332629115"/>
+        <p14:creationId xmlns:p14="http://schemas.microsoft.com/office/powerpoint/2010/main" val="207348330"/>
       </p:ext>
     </p:extLst>
   </p:cSld>
@@ -5764,6 +5769,114 @@
             <a:spLocks noGrp="1"/>
           </p:cNvSpPr>
           <p:nvPr>
+            <p:ph type="title"/>
+          </p:nvPr>
+        </p:nvSpPr>
+        <p:spPr/>
+        <p:txBody>
+          <a:bodyPr/>
+          <a:lstStyle/>
+          <a:p>
+            <a:r>
+              <a:rPr lang="fr-FR" dirty="0"/>
+              <a:t>SLAM</a:t>
+            </a:r>
+          </a:p>
+        </p:txBody>
+      </p:sp>
+      <p:sp>
+        <p:nvSpPr>
+          <p:cNvPr id="3" name="Espace réservé du contenu 2"/>
+          <p:cNvSpPr>
+            <a:spLocks noGrp="1"/>
+          </p:cNvSpPr>
+          <p:nvPr>
+            <p:ph idx="1"/>
+          </p:nvPr>
+        </p:nvSpPr>
+        <p:spPr/>
+        <p:txBody>
+          <a:bodyPr/>
+          <a:lstStyle/>
+          <a:p>
+            <a:r>
+              <a:rPr lang="fr-FR" dirty="0"/>
+              <a:t>EKF-SLAM (</a:t>
+            </a:r>
+            <a:r>
+              <a:rPr lang="fr-FR" dirty="0" err="1"/>
+              <a:t>Kalman</a:t>
+            </a:r>
+            <a:r>
+              <a:rPr lang="fr-FR" dirty="0"/>
+              <a:t> </a:t>
+            </a:r>
+            <a:r>
+              <a:rPr lang="fr-FR" dirty="0" err="1"/>
+              <a:t>Filter</a:t>
+            </a:r>
+            <a:r>
+              <a:rPr lang="fr-FR" dirty="0"/>
+              <a:t>)</a:t>
+            </a:r>
+          </a:p>
+          <a:p>
+            <a:r>
+              <a:rPr lang="fr-FR" dirty="0"/>
+              <a:t>FAST-SLAM 1,0 et 2,0 (particules)</a:t>
+            </a:r>
+          </a:p>
+          <a:p>
+            <a:r>
+              <a:rPr lang="fr-FR" dirty="0"/>
+              <a:t>Optical-SLAM…</a:t>
+            </a:r>
+          </a:p>
+          <a:p>
+            <a:r>
+              <a:rPr lang="fr-FR" dirty="0"/>
+              <a:t>Autres ?</a:t>
+            </a:r>
+          </a:p>
+        </p:txBody>
+      </p:sp>
+    </p:spTree>
+    <p:extLst>
+      <p:ext uri="{BB962C8B-B14F-4D97-AF65-F5344CB8AC3E}">
+        <p14:creationId xmlns:p14="http://schemas.microsoft.com/office/powerpoint/2010/main" val="332629115"/>
+      </p:ext>
+    </p:extLst>
+  </p:cSld>
+  <p:clrMapOvr>
+    <a:masterClrMapping/>
+  </p:clrMapOvr>
+</p:sld>
+</file>
+
+<file path=ppt/slides/slide25.xml><?xml version="1.0" encoding="utf-8"?>
+<p:sld xmlns:a="http://schemas.openxmlformats.org/drawingml/2006/main" xmlns:r="http://schemas.openxmlformats.org/officeDocument/2006/relationships" xmlns:p="http://schemas.openxmlformats.org/presentationml/2006/main">
+  <p:cSld>
+    <p:spTree>
+      <p:nvGrpSpPr>
+        <p:cNvPr id="1" name=""/>
+        <p:cNvGrpSpPr/>
+        <p:nvPr/>
+      </p:nvGrpSpPr>
+      <p:grpSpPr>
+        <a:xfrm>
+          <a:off x="0" y="0"/>
+          <a:ext cx="0" cy="0"/>
+          <a:chOff x="0" y="0"/>
+          <a:chExt cx="0" cy="0"/>
+        </a:xfrm>
+      </p:grpSpPr>
+      <p:sp>
+        <p:nvSpPr>
+          <p:cNvPr id="2" name="Titre 1"/>
+          <p:cNvSpPr>
+            <a:spLocks noGrp="1"/>
+          </p:cNvSpPr>
+          <p:nvPr>
             <p:ph type="ctrTitle"/>
           </p:nvPr>
         </p:nvSpPr>
@@ -5811,7 +5924,7 @@
 </p:sld>
 </file>
 
-<file path=ppt/slides/slide25.xml><?xml version="1.0" encoding="utf-8"?>
+<file path=ppt/slides/slide26.xml><?xml version="1.0" encoding="utf-8"?>
 <p:sld xmlns:a="http://schemas.openxmlformats.org/drawingml/2006/main" xmlns:r="http://schemas.openxmlformats.org/officeDocument/2006/relationships" xmlns:p="http://schemas.openxmlformats.org/presentationml/2006/main">
   <p:cSld>
     <p:spTree>

</xml_diff>

<commit_message>
PR with noise and bias but failure at 5th turn
</commit_message>
<xml_diff>
--- a/60 - Simulator/session SLAM v0.05.pptx
+++ b/60 - Simulator/session SLAM v0.05.pptx
@@ -26,11 +26,13 @@
     <p:sldId id="277" r:id="rId20"/>
     <p:sldId id="279" r:id="rId21"/>
     <p:sldId id="284" r:id="rId22"/>
-    <p:sldId id="272" r:id="rId23"/>
-    <p:sldId id="270" r:id="rId24"/>
-    <p:sldId id="273" r:id="rId25"/>
-    <p:sldId id="280" r:id="rId26"/>
-    <p:sldId id="281" r:id="rId27"/>
+    <p:sldId id="285" r:id="rId23"/>
+    <p:sldId id="286" r:id="rId24"/>
+    <p:sldId id="272" r:id="rId25"/>
+    <p:sldId id="270" r:id="rId26"/>
+    <p:sldId id="273" r:id="rId27"/>
+    <p:sldId id="280" r:id="rId28"/>
+    <p:sldId id="281" r:id="rId29"/>
   </p:sldIdLst>
   <p:sldSz cx="9144000" cy="6858000" type="screen4x3"/>
   <p:notesSz cx="6858000" cy="9144000"/>
@@ -4886,7 +4888,7 @@
         <p:spPr/>
         <p:txBody>
           <a:bodyPr>
-            <a:normAutofit fontScale="77500" lnSpcReduction="20000"/>
+            <a:normAutofit fontScale="62500" lnSpcReduction="20000"/>
           </a:bodyPr>
           <a:lstStyle/>
           <a:p>
@@ -4921,7 +4923,14 @@
             <a:pPr lvl="1"/>
             <a:r>
               <a:rPr lang="fr-FR" dirty="0"/>
-              <a:t>Matrice 0,1m x 0,1m étendue +/-1m</a:t>
+              <a:t>Matrice XY 0,1m x 0,1m étendue +/-1m </a:t>
+            </a:r>
+          </a:p>
+          <a:p>
+            <a:pPr lvl="1"/>
+            <a:r>
+              <a:rPr lang="fr-FR" dirty="0"/>
+              <a:t>3 couches H : -0.1°,0.0° et +0.1°</a:t>
             </a:r>
           </a:p>
           <a:p>
@@ -4971,17 +4980,43 @@
             <a:pPr lvl="1"/>
             <a:r>
               <a:rPr lang="fr-FR" dirty="0"/>
-              <a:t>« Fonction d’activation » </a:t>
+              <a:t>« Fonction d’activation »</a:t>
             </a:r>
           </a:p>
           <a:p>
             <a:pPr lvl="2"/>
             <a:r>
               <a:rPr lang="fr-FR" dirty="0"/>
-              <a:t>Linéaire de 0,0m à 0,2m, puis nulle au-delà de 0,2m (à ajuster)</a:t>
-            </a:r>
-          </a:p>
-          <a:p>
+              <a:t>0,0m à 0,1m </a:t>
+            </a:r>
+            <a:r>
+              <a:rPr lang="fr-FR" dirty="0">
+                <a:sym typeface="Wingdings" panose="05000000000000000000" pitchFamily="2" charset="2"/>
+              </a:rPr>
+              <a:t> p=100%</a:t>
+            </a:r>
+          </a:p>
+          <a:p>
+            <a:pPr lvl="2"/>
+            <a:r>
+              <a:rPr lang="fr-FR" dirty="0"/>
+              <a:t>0,1m à 0,3m </a:t>
+            </a:r>
+            <a:r>
+              <a:rPr lang="fr-FR" dirty="0">
+                <a:sym typeface="Wingdings" panose="05000000000000000000" pitchFamily="2" charset="2"/>
+              </a:rPr>
+              <a:t> Décroissance linéaire de p=100% à 0%</a:t>
+            </a:r>
+          </a:p>
+          <a:p>
+            <a:pPr lvl="2"/>
+            <a:r>
+              <a:rPr lang="fr-FR" dirty="0">
+                <a:sym typeface="Wingdings" panose="05000000000000000000" pitchFamily="2" charset="2"/>
+              </a:rPr>
+              <a:t>0,3m et +  p=0%</a:t>
+            </a:r>
             <a:endParaRPr lang="fr-FR" dirty="0"/>
           </a:p>
         </p:txBody>
@@ -5327,6 +5362,14 @@
 <file path=ppt/slides/slide21.xml><?xml version="1.0" encoding="utf-8"?>
 <p:sld xmlns:a="http://schemas.openxmlformats.org/drawingml/2006/main" xmlns:r="http://schemas.openxmlformats.org/officeDocument/2006/relationships" xmlns:p="http://schemas.openxmlformats.org/presentationml/2006/main">
   <p:cSld>
+    <p:bg>
+      <p:bgPr>
+        <a:solidFill>
+          <a:schemeClr val="bg1"/>
+        </a:solidFill>
+        <a:effectLst/>
+      </p:bgPr>
+    </p:bg>
     <p:spTree>
       <p:nvGrpSpPr>
         <p:cNvPr id="1" name=""/>
@@ -5363,67 +5406,232 @@
           <a:lstStyle/>
           <a:p>
             <a:r>
-              <a:rPr lang="fr-FR" dirty="0"/>
+              <a:rPr lang="fr-FR"/>
               <a:t>Algorithme SLAM « maison »</a:t>
             </a:r>
           </a:p>
         </p:txBody>
       </p:sp>
-      <p:sp>
-        <p:nvSpPr>
-          <p:cNvPr id="3" name="Espace réservé du contenu 2">
+      <p:pic>
+        <p:nvPicPr>
+          <p:cNvPr id="9" name="Espace réservé du contenu 8" descr="Une image contenant texte, carte&#10;&#10;Description générée automatiquement">
             <a:extLst>
               <a:ext uri="{FF2B5EF4-FFF2-40B4-BE49-F238E27FC236}">
-                <a16:creationId xmlns:a16="http://schemas.microsoft.com/office/drawing/2014/main" id="{68EC7013-92F8-4C4D-BEB6-2F350BB182E9}"/>
-              </a:ext>
-            </a:extLst>
-          </p:cNvPr>
-          <p:cNvSpPr>
-            <a:spLocks noGrp="1"/>
-          </p:cNvSpPr>
-          <p:nvPr>
-            <p:ph idx="1"/>
-          </p:nvPr>
-        </p:nvSpPr>
-        <p:spPr/>
-        <p:txBody>
-          <a:bodyPr/>
-          <a:lstStyle/>
-          <a:p>
-            <a:endParaRPr lang="fr-FR"/>
-          </a:p>
-        </p:txBody>
-      </p:sp>
-      <p:pic>
-        <p:nvPicPr>
-          <p:cNvPr id="4" name="Image 3">
-            <a:extLst>
-              <a:ext uri="{FF2B5EF4-FFF2-40B4-BE49-F238E27FC236}">
-                <a16:creationId xmlns:a16="http://schemas.microsoft.com/office/drawing/2014/main" id="{E632ED82-6C53-4886-B66E-9E13657D9D42}"/>
+                <a16:creationId xmlns:a16="http://schemas.microsoft.com/office/drawing/2014/main" id="{53E2D2AE-F28E-436C-B37F-65D8988C1F5A}"/>
               </a:ext>
             </a:extLst>
           </p:cNvPr>
           <p:cNvPicPr>
-            <a:picLocks noChangeAspect="1"/>
+            <a:picLocks noGrp="1" noChangeAspect="1"/>
           </p:cNvPicPr>
-          <p:nvPr/>
+          <p:nvPr>
+            <p:ph idx="1"/>
+          </p:nvPr>
         </p:nvPicPr>
         <p:blipFill>
-          <a:blip r:embed="rId2"/>
+          <a:blip r:embed="rId2" cstate="print">
+            <a:extLst>
+              <a:ext uri="{28A0092B-C50C-407E-A947-70E740481C1C}">
+                <a14:useLocalDpi xmlns:a14="http://schemas.microsoft.com/office/drawing/2010/main" val="0"/>
+              </a:ext>
+            </a:extLst>
+          </a:blip>
           <a:stretch>
             <a:fillRect/>
           </a:stretch>
         </p:blipFill>
         <p:spPr>
           <a:xfrm>
-            <a:off x="0" y="1604962"/>
-            <a:ext cx="9144000" cy="5253038"/>
+            <a:off x="632812" y="1600200"/>
+            <a:ext cx="7878376" cy="4525963"/>
+          </a:xfrm>
+        </p:spPr>
+      </p:pic>
+      <p:sp>
+        <p:nvSpPr>
+          <p:cNvPr id="11" name="Content Placeholder 9">
+            <a:extLst>
+              <a:ext uri="{FF2B5EF4-FFF2-40B4-BE49-F238E27FC236}">
+                <a16:creationId xmlns:a16="http://schemas.microsoft.com/office/drawing/2014/main" id="{CB3F12D1-6769-4CF6-8A67-D07C9EC65C47}"/>
+              </a:ext>
+            </a:extLst>
+          </p:cNvPr>
+          <p:cNvSpPr txBox="1">
+            <a:spLocks/>
+          </p:cNvSpPr>
+          <p:nvPr/>
+        </p:nvSpPr>
+        <p:spPr>
+          <a:xfrm>
+            <a:off x="0" y="5791200"/>
+            <a:ext cx="2343150" cy="1066800"/>
           </a:xfrm>
           <a:prstGeom prst="rect">
             <a:avLst/>
           </a:prstGeom>
         </p:spPr>
-      </p:pic>
+        <p:txBody>
+          <a:bodyPr vert="horz" lIns="91440" tIns="45720" rIns="91440" bIns="45720" rtlCol="0">
+            <a:normAutofit/>
+          </a:bodyPr>
+          <a:lstStyle>
+            <a:lvl1pPr marL="342900" indent="-342900" algn="l" defTabSz="914400" rtl="0" eaLnBrk="1" latinLnBrk="0" hangingPunct="1">
+              <a:spcBef>
+                <a:spcPct val="20000"/>
+              </a:spcBef>
+              <a:buFont typeface="Arial" pitchFamily="34" charset="0"/>
+              <a:buChar char="•"/>
+              <a:defRPr sz="3200" kern="1200">
+                <a:solidFill>
+                  <a:schemeClr val="tx1"/>
+                </a:solidFill>
+                <a:latin typeface="+mn-lt"/>
+                <a:ea typeface="+mn-ea"/>
+                <a:cs typeface="+mn-cs"/>
+              </a:defRPr>
+            </a:lvl1pPr>
+            <a:lvl2pPr marL="742950" indent="-285750" algn="l" defTabSz="914400" rtl="0" eaLnBrk="1" latinLnBrk="0" hangingPunct="1">
+              <a:spcBef>
+                <a:spcPct val="20000"/>
+              </a:spcBef>
+              <a:buFont typeface="Arial" pitchFamily="34" charset="0"/>
+              <a:buChar char="–"/>
+              <a:defRPr sz="2800" kern="1200">
+                <a:solidFill>
+                  <a:schemeClr val="tx1"/>
+                </a:solidFill>
+                <a:latin typeface="+mn-lt"/>
+                <a:ea typeface="+mn-ea"/>
+                <a:cs typeface="+mn-cs"/>
+              </a:defRPr>
+            </a:lvl2pPr>
+            <a:lvl3pPr marL="1143000" indent="-228600" algn="l" defTabSz="914400" rtl="0" eaLnBrk="1" latinLnBrk="0" hangingPunct="1">
+              <a:spcBef>
+                <a:spcPct val="20000"/>
+              </a:spcBef>
+              <a:buFont typeface="Arial" pitchFamily="34" charset="0"/>
+              <a:buChar char="•"/>
+              <a:defRPr sz="2400" kern="1200">
+                <a:solidFill>
+                  <a:schemeClr val="tx1"/>
+                </a:solidFill>
+                <a:latin typeface="+mn-lt"/>
+                <a:ea typeface="+mn-ea"/>
+                <a:cs typeface="+mn-cs"/>
+              </a:defRPr>
+            </a:lvl3pPr>
+            <a:lvl4pPr marL="1600200" indent="-228600" algn="l" defTabSz="914400" rtl="0" eaLnBrk="1" latinLnBrk="0" hangingPunct="1">
+              <a:spcBef>
+                <a:spcPct val="20000"/>
+              </a:spcBef>
+              <a:buFont typeface="Arial" pitchFamily="34" charset="0"/>
+              <a:buChar char="–"/>
+              <a:defRPr sz="2000" kern="1200">
+                <a:solidFill>
+                  <a:schemeClr val="tx1"/>
+                </a:solidFill>
+                <a:latin typeface="+mn-lt"/>
+                <a:ea typeface="+mn-ea"/>
+                <a:cs typeface="+mn-cs"/>
+              </a:defRPr>
+            </a:lvl4pPr>
+            <a:lvl5pPr marL="2057400" indent="-228600" algn="l" defTabSz="914400" rtl="0" eaLnBrk="1" latinLnBrk="0" hangingPunct="1">
+              <a:spcBef>
+                <a:spcPct val="20000"/>
+              </a:spcBef>
+              <a:buFont typeface="Arial" pitchFamily="34" charset="0"/>
+              <a:buChar char="»"/>
+              <a:defRPr sz="2000" kern="1200">
+                <a:solidFill>
+                  <a:schemeClr val="tx1"/>
+                </a:solidFill>
+                <a:latin typeface="+mn-lt"/>
+                <a:ea typeface="+mn-ea"/>
+                <a:cs typeface="+mn-cs"/>
+              </a:defRPr>
+            </a:lvl5pPr>
+            <a:lvl6pPr marL="2514600" indent="-228600" algn="l" defTabSz="914400" rtl="0" eaLnBrk="1" latinLnBrk="0" hangingPunct="1">
+              <a:spcBef>
+                <a:spcPct val="20000"/>
+              </a:spcBef>
+              <a:buFont typeface="Arial" pitchFamily="34" charset="0"/>
+              <a:buChar char="•"/>
+              <a:defRPr sz="2000" kern="1200">
+                <a:solidFill>
+                  <a:schemeClr val="tx1"/>
+                </a:solidFill>
+                <a:latin typeface="+mn-lt"/>
+                <a:ea typeface="+mn-ea"/>
+                <a:cs typeface="+mn-cs"/>
+              </a:defRPr>
+            </a:lvl6pPr>
+            <a:lvl7pPr marL="2971800" indent="-228600" algn="l" defTabSz="914400" rtl="0" eaLnBrk="1" latinLnBrk="0" hangingPunct="1">
+              <a:spcBef>
+                <a:spcPct val="20000"/>
+              </a:spcBef>
+              <a:buFont typeface="Arial" pitchFamily="34" charset="0"/>
+              <a:buChar char="•"/>
+              <a:defRPr sz="2000" kern="1200">
+                <a:solidFill>
+                  <a:schemeClr val="tx1"/>
+                </a:solidFill>
+                <a:latin typeface="+mn-lt"/>
+                <a:ea typeface="+mn-ea"/>
+                <a:cs typeface="+mn-cs"/>
+              </a:defRPr>
+            </a:lvl7pPr>
+            <a:lvl8pPr marL="3429000" indent="-228600" algn="l" defTabSz="914400" rtl="0" eaLnBrk="1" latinLnBrk="0" hangingPunct="1">
+              <a:spcBef>
+                <a:spcPct val="20000"/>
+              </a:spcBef>
+              <a:buFont typeface="Arial" pitchFamily="34" charset="0"/>
+              <a:buChar char="•"/>
+              <a:defRPr sz="2000" kern="1200">
+                <a:solidFill>
+                  <a:schemeClr val="tx1"/>
+                </a:solidFill>
+                <a:latin typeface="+mn-lt"/>
+                <a:ea typeface="+mn-ea"/>
+                <a:cs typeface="+mn-cs"/>
+              </a:defRPr>
+            </a:lvl8pPr>
+            <a:lvl9pPr marL="3886200" indent="-228600" algn="l" defTabSz="914400" rtl="0" eaLnBrk="1" latinLnBrk="0" hangingPunct="1">
+              <a:spcBef>
+                <a:spcPct val="20000"/>
+              </a:spcBef>
+              <a:buFont typeface="Arial" pitchFamily="34" charset="0"/>
+              <a:buChar char="•"/>
+              <a:defRPr sz="2000" kern="1200">
+                <a:solidFill>
+                  <a:schemeClr val="tx1"/>
+                </a:solidFill>
+                <a:latin typeface="+mn-lt"/>
+                <a:ea typeface="+mn-ea"/>
+                <a:cs typeface="+mn-cs"/>
+              </a:defRPr>
+            </a:lvl9pPr>
+          </a:lstStyle>
+          <a:p>
+            <a:r>
+              <a:rPr lang="en-US" sz="1700"/>
+              <a:t>Bruit v = 0m/s</a:t>
+            </a:r>
+          </a:p>
+          <a:p>
+            <a:r>
+              <a:rPr lang="en-US" sz="1700"/>
+              <a:t>Bruit w = 0dps</a:t>
+            </a:r>
+          </a:p>
+          <a:p>
+            <a:r>
+              <a:rPr lang="en-US" sz="1700"/>
+              <a:t>Bias w = 0dps</a:t>
+            </a:r>
+            <a:endParaRPr lang="en-US" sz="1700" dirty="0"/>
+          </a:p>
+        </p:txBody>
+      </p:sp>
     </p:spTree>
     <p:extLst>
       <p:ext uri="{BB962C8B-B14F-4D97-AF65-F5344CB8AC3E}">
@@ -5440,6 +5648,14 @@
 <file path=ppt/slides/slide22.xml><?xml version="1.0" encoding="utf-8"?>
 <p:sld xmlns:a="http://schemas.openxmlformats.org/drawingml/2006/main" xmlns:r="http://schemas.openxmlformats.org/officeDocument/2006/relationships" xmlns:p="http://schemas.openxmlformats.org/presentationml/2006/main">
   <p:cSld>
+    <p:bg>
+      <p:bgPr>
+        <a:solidFill>
+          <a:schemeClr val="bg1"/>
+        </a:solidFill>
+        <a:effectLst/>
+      </p:bgPr>
+    </p:bg>
     <p:spTree>
       <p:nvGrpSpPr>
         <p:cNvPr id="1" name=""/>
@@ -5456,7 +5672,13 @@
       </p:grpSpPr>
       <p:sp>
         <p:nvSpPr>
-          <p:cNvPr id="2" name="Titre 1"/>
+          <p:cNvPr id="2" name="Titre 1">
+            <a:extLst>
+              <a:ext uri="{FF2B5EF4-FFF2-40B4-BE49-F238E27FC236}">
+                <a16:creationId xmlns:a16="http://schemas.microsoft.com/office/drawing/2014/main" id="{1AC18A72-3633-44BC-9268-BA6148FA80F1}"/>
+              </a:ext>
+            </a:extLst>
+          </p:cNvPr>
           <p:cNvSpPr>
             <a:spLocks noGrp="1"/>
           </p:cNvSpPr>
@@ -5470,190 +5692,227 @@
           <a:lstStyle/>
           <a:p>
             <a:r>
-              <a:rPr lang="fr-FR" dirty="0"/>
+              <a:rPr lang="fr-FR"/>
               <a:t>Algorithme SLAM « maison »</a:t>
             </a:r>
           </a:p>
         </p:txBody>
       </p:sp>
-      <p:sp>
-        <p:nvSpPr>
-          <p:cNvPr id="3" name="Espace réservé du contenu 2"/>
-          <p:cNvSpPr>
-            <a:spLocks noGrp="1"/>
-          </p:cNvSpPr>
+      <p:pic>
+        <p:nvPicPr>
+          <p:cNvPr id="8" name="Espace réservé du contenu 7" descr="Une image contenant texte, carte&#10;&#10;Description générée automatiquement">
+            <a:extLst>
+              <a:ext uri="{FF2B5EF4-FFF2-40B4-BE49-F238E27FC236}">
+                <a16:creationId xmlns:a16="http://schemas.microsoft.com/office/drawing/2014/main" id="{7C02C8D6-06A4-45DB-B0DE-37EED5D13EAB}"/>
+              </a:ext>
+            </a:extLst>
+          </p:cNvPr>
+          <p:cNvPicPr>
+            <a:picLocks noGrp="1" noChangeAspect="1"/>
+          </p:cNvPicPr>
           <p:nvPr>
             <p:ph idx="1"/>
           </p:nvPr>
-        </p:nvSpPr>
-        <p:spPr/>
-        <p:txBody>
-          <a:bodyPr>
-            <a:normAutofit fontScale="70000" lnSpcReduction="20000"/>
+        </p:nvPicPr>
+        <p:blipFill>
+          <a:blip r:embed="rId2" cstate="print">
+            <a:extLst>
+              <a:ext uri="{28A0092B-C50C-407E-A947-70E740481C1C}">
+                <a14:useLocalDpi xmlns:a14="http://schemas.microsoft.com/office/drawing/2010/main" val="0"/>
+              </a:ext>
+            </a:extLst>
+          </a:blip>
+          <a:stretch>
+            <a:fillRect/>
+          </a:stretch>
+        </p:blipFill>
+        <p:spPr>
+          <a:xfrm>
+            <a:off x="632812" y="1600200"/>
+            <a:ext cx="7878376" cy="4525963"/>
+          </a:xfrm>
+        </p:spPr>
+      </p:pic>
+      <p:sp>
+        <p:nvSpPr>
+          <p:cNvPr id="11" name="Content Placeholder 9">
+            <a:extLst>
+              <a:ext uri="{FF2B5EF4-FFF2-40B4-BE49-F238E27FC236}">
+                <a16:creationId xmlns:a16="http://schemas.microsoft.com/office/drawing/2014/main" id="{F7DED74A-2B34-4D8A-98E0-E49290C27D99}"/>
+              </a:ext>
+            </a:extLst>
+          </p:cNvPr>
+          <p:cNvSpPr txBox="1">
+            <a:spLocks/>
+          </p:cNvSpPr>
+          <p:nvPr/>
+        </p:nvSpPr>
+        <p:spPr>
+          <a:xfrm>
+            <a:off x="0" y="5715000"/>
+            <a:ext cx="2286000" cy="1143000"/>
+          </a:xfrm>
+          <a:prstGeom prst="rect">
+            <a:avLst/>
+          </a:prstGeom>
+        </p:spPr>
+        <p:txBody>
+          <a:bodyPr vert="horz" lIns="91440" tIns="45720" rIns="91440" bIns="45720" rtlCol="0">
+            <a:normAutofit/>
           </a:bodyPr>
-          <a:lstStyle/>
-          <a:p>
-            <a:r>
-              <a:rPr lang="fr-FR" dirty="0"/>
-              <a:t>Limitations  &amp; Problèmes</a:t>
-            </a:r>
-          </a:p>
-          <a:p>
-            <a:pPr lvl="1"/>
-            <a:r>
-              <a:rPr lang="fr-FR" dirty="0"/>
-              <a:t>Correction de la translation seulement (</a:t>
-            </a:r>
-            <a:r>
-              <a:rPr lang="fr-FR" dirty="0" err="1"/>
-              <a:t>x,y</a:t>
-            </a:r>
-            <a:r>
-              <a:rPr lang="fr-FR" dirty="0"/>
-              <a:t>)</a:t>
-            </a:r>
-          </a:p>
-          <a:p>
-            <a:pPr lvl="1"/>
-            <a:r>
-              <a:rPr lang="fr-FR" dirty="0"/>
-              <a:t>Pas d’algorithme de fermeture de boucle </a:t>
-            </a:r>
-          </a:p>
-          <a:p>
-            <a:pPr lvl="1"/>
-            <a:r>
-              <a:rPr lang="fr-FR" dirty="0">
+          <a:lstStyle>
+            <a:lvl1pPr marL="342900" indent="-342900" algn="l" defTabSz="914400" rtl="0" eaLnBrk="1" latinLnBrk="0" hangingPunct="1">
+              <a:spcBef>
+                <a:spcPct val="20000"/>
+              </a:spcBef>
+              <a:buFont typeface="Arial" pitchFamily="34" charset="0"/>
+              <a:buChar char="•"/>
+              <a:defRPr sz="3200" kern="1200">
                 <a:solidFill>
-                  <a:srgbClr val="FF0000"/>
+                  <a:schemeClr val="tx1"/>
                 </a:solidFill>
-              </a:rPr>
-              <a:t>Fermeture de boucle avec bruit (</a:t>
-            </a:r>
-            <a:r>
-              <a:rPr lang="fr-FR" dirty="0" err="1">
+                <a:latin typeface="+mn-lt"/>
+                <a:ea typeface="+mn-ea"/>
+                <a:cs typeface="+mn-cs"/>
+              </a:defRPr>
+            </a:lvl1pPr>
+            <a:lvl2pPr marL="742950" indent="-285750" algn="l" defTabSz="914400" rtl="0" eaLnBrk="1" latinLnBrk="0" hangingPunct="1">
+              <a:spcBef>
+                <a:spcPct val="20000"/>
+              </a:spcBef>
+              <a:buFont typeface="Arial" pitchFamily="34" charset="0"/>
+              <a:buChar char="–"/>
+              <a:defRPr sz="2800" kern="1200">
                 <a:solidFill>
-                  <a:srgbClr val="FF0000"/>
+                  <a:schemeClr val="tx1"/>
                 </a:solidFill>
-              </a:rPr>
-              <a:t>v,w</a:t>
-            </a:r>
-            <a:r>
-              <a:rPr lang="fr-FR" dirty="0">
+                <a:latin typeface="+mn-lt"/>
+                <a:ea typeface="+mn-ea"/>
+                <a:cs typeface="+mn-cs"/>
+              </a:defRPr>
+            </a:lvl2pPr>
+            <a:lvl3pPr marL="1143000" indent="-228600" algn="l" defTabSz="914400" rtl="0" eaLnBrk="1" latinLnBrk="0" hangingPunct="1">
+              <a:spcBef>
+                <a:spcPct val="20000"/>
+              </a:spcBef>
+              <a:buFont typeface="Arial" pitchFamily="34" charset="0"/>
+              <a:buChar char="•"/>
+              <a:defRPr sz="2400" kern="1200">
                 <a:solidFill>
-                  <a:srgbClr val="FF0000"/>
+                  <a:schemeClr val="tx1"/>
                 </a:solidFill>
-              </a:rPr>
-              <a:t>)</a:t>
-            </a:r>
-          </a:p>
-          <a:p>
-            <a:pPr lvl="1"/>
-            <a:r>
-              <a:rPr lang="fr-FR" dirty="0"/>
-              <a:t>Temps de calcul </a:t>
-            </a:r>
-            <a:r>
-              <a:rPr lang="fr-FR" dirty="0">
-                <a:sym typeface="Wingdings" panose="05000000000000000000" pitchFamily="2" charset="2"/>
-              </a:rPr>
-              <a:t> VECTORISER/SIMPLIFIER</a:t>
-            </a:r>
-          </a:p>
-          <a:p>
-            <a:pPr lvl="1"/>
-            <a:endParaRPr lang="fr-FR" dirty="0"/>
-          </a:p>
-          <a:p>
-            <a:r>
-              <a:rPr lang="fr-FR" dirty="0"/>
-              <a:t>Améliorations :</a:t>
-            </a:r>
-          </a:p>
-          <a:p>
-            <a:pPr lvl="1"/>
-            <a:r>
-              <a:rPr lang="fr-FR" dirty="0"/>
-              <a:t>Faire ce qui est présenté ! </a:t>
-            </a:r>
-            <a:r>
-              <a:rPr lang="fr-FR" dirty="0">
-                <a:sym typeface="Wingdings" panose="05000000000000000000" pitchFamily="2" charset="2"/>
-              </a:rPr>
-              <a:t></a:t>
-            </a:r>
-          </a:p>
-          <a:p>
-            <a:pPr lvl="1"/>
-            <a:r>
-              <a:rPr lang="fr-FR" dirty="0"/>
-              <a:t>Ajouter la corriger du cap en 4-5-6</a:t>
-            </a:r>
-          </a:p>
-          <a:p>
-            <a:pPr lvl="1"/>
-            <a:r>
-              <a:rPr lang="fr-FR" dirty="0"/>
-              <a:t>Ajouter une fermeture de boucle </a:t>
-            </a:r>
-          </a:p>
-          <a:p>
-            <a:pPr lvl="2"/>
-            <a:r>
-              <a:rPr lang="fr-FR" dirty="0"/>
-              <a:t>Détection de la fermeture de boucle (</a:t>
-            </a:r>
-            <a:r>
-              <a:rPr lang="fr-FR" dirty="0" err="1"/>
-              <a:t>x,y,h</a:t>
-            </a:r>
-            <a:r>
-              <a:rPr lang="fr-FR" dirty="0"/>
-              <a:t>)t1 == (</a:t>
-            </a:r>
-            <a:r>
-              <a:rPr lang="fr-FR" dirty="0" err="1"/>
-              <a:t>x,y,h</a:t>
-            </a:r>
-            <a:r>
-              <a:rPr lang="fr-FR" dirty="0"/>
-              <a:t>)t2, t1&lt;&gt;t2</a:t>
-            </a:r>
-          </a:p>
-          <a:p>
-            <a:pPr lvl="2"/>
-            <a:r>
-              <a:rPr lang="fr-FR" dirty="0"/>
-              <a:t>Scruter l’évolution de la carte suite à la fermeture </a:t>
-            </a:r>
-            <a:r>
-              <a:rPr lang="fr-FR" dirty="0">
-                <a:sym typeface="Wingdings" panose="05000000000000000000" pitchFamily="2" charset="2"/>
-              </a:rPr>
-              <a:t> détection d’anomalie</a:t>
-            </a:r>
-            <a:endParaRPr lang="fr-FR" dirty="0"/>
-          </a:p>
-          <a:p>
-            <a:pPr lvl="1"/>
-            <a:r>
-              <a:rPr lang="fr-FR" dirty="0"/>
-              <a:t>Réjection des obstacles fugitifs / mobiles</a:t>
-            </a:r>
-          </a:p>
-          <a:p>
-            <a:pPr lvl="2"/>
-            <a:r>
-              <a:rPr lang="fr-FR" dirty="0"/>
-              <a:t>Estimation de la fiabilité et/ou de l’espérance de vie des ‘</a:t>
-            </a:r>
-            <a:r>
-              <a:rPr lang="fr-FR" dirty="0" err="1"/>
-              <a:t>landmarks</a:t>
-            </a:r>
-            <a:r>
-              <a:rPr lang="fr-FR" dirty="0"/>
-              <a:t>’</a:t>
+                <a:latin typeface="+mn-lt"/>
+                <a:ea typeface="+mn-ea"/>
+                <a:cs typeface="+mn-cs"/>
+              </a:defRPr>
+            </a:lvl3pPr>
+            <a:lvl4pPr marL="1600200" indent="-228600" algn="l" defTabSz="914400" rtl="0" eaLnBrk="1" latinLnBrk="0" hangingPunct="1">
+              <a:spcBef>
+                <a:spcPct val="20000"/>
+              </a:spcBef>
+              <a:buFont typeface="Arial" pitchFamily="34" charset="0"/>
+              <a:buChar char="–"/>
+              <a:defRPr sz="2000" kern="1200">
+                <a:solidFill>
+                  <a:schemeClr val="tx1"/>
+                </a:solidFill>
+                <a:latin typeface="+mn-lt"/>
+                <a:ea typeface="+mn-ea"/>
+                <a:cs typeface="+mn-cs"/>
+              </a:defRPr>
+            </a:lvl4pPr>
+            <a:lvl5pPr marL="2057400" indent="-228600" algn="l" defTabSz="914400" rtl="0" eaLnBrk="1" latinLnBrk="0" hangingPunct="1">
+              <a:spcBef>
+                <a:spcPct val="20000"/>
+              </a:spcBef>
+              <a:buFont typeface="Arial" pitchFamily="34" charset="0"/>
+              <a:buChar char="»"/>
+              <a:defRPr sz="2000" kern="1200">
+                <a:solidFill>
+                  <a:schemeClr val="tx1"/>
+                </a:solidFill>
+                <a:latin typeface="+mn-lt"/>
+                <a:ea typeface="+mn-ea"/>
+                <a:cs typeface="+mn-cs"/>
+              </a:defRPr>
+            </a:lvl5pPr>
+            <a:lvl6pPr marL="2514600" indent="-228600" algn="l" defTabSz="914400" rtl="0" eaLnBrk="1" latinLnBrk="0" hangingPunct="1">
+              <a:spcBef>
+                <a:spcPct val="20000"/>
+              </a:spcBef>
+              <a:buFont typeface="Arial" pitchFamily="34" charset="0"/>
+              <a:buChar char="•"/>
+              <a:defRPr sz="2000" kern="1200">
+                <a:solidFill>
+                  <a:schemeClr val="tx1"/>
+                </a:solidFill>
+                <a:latin typeface="+mn-lt"/>
+                <a:ea typeface="+mn-ea"/>
+                <a:cs typeface="+mn-cs"/>
+              </a:defRPr>
+            </a:lvl6pPr>
+            <a:lvl7pPr marL="2971800" indent="-228600" algn="l" defTabSz="914400" rtl="0" eaLnBrk="1" latinLnBrk="0" hangingPunct="1">
+              <a:spcBef>
+                <a:spcPct val="20000"/>
+              </a:spcBef>
+              <a:buFont typeface="Arial" pitchFamily="34" charset="0"/>
+              <a:buChar char="•"/>
+              <a:defRPr sz="2000" kern="1200">
+                <a:solidFill>
+                  <a:schemeClr val="tx1"/>
+                </a:solidFill>
+                <a:latin typeface="+mn-lt"/>
+                <a:ea typeface="+mn-ea"/>
+                <a:cs typeface="+mn-cs"/>
+              </a:defRPr>
+            </a:lvl7pPr>
+            <a:lvl8pPr marL="3429000" indent="-228600" algn="l" defTabSz="914400" rtl="0" eaLnBrk="1" latinLnBrk="0" hangingPunct="1">
+              <a:spcBef>
+                <a:spcPct val="20000"/>
+              </a:spcBef>
+              <a:buFont typeface="Arial" pitchFamily="34" charset="0"/>
+              <a:buChar char="•"/>
+              <a:defRPr sz="2000" kern="1200">
+                <a:solidFill>
+                  <a:schemeClr val="tx1"/>
+                </a:solidFill>
+                <a:latin typeface="+mn-lt"/>
+                <a:ea typeface="+mn-ea"/>
+                <a:cs typeface="+mn-cs"/>
+              </a:defRPr>
+            </a:lvl8pPr>
+            <a:lvl9pPr marL="3886200" indent="-228600" algn="l" defTabSz="914400" rtl="0" eaLnBrk="1" latinLnBrk="0" hangingPunct="1">
+              <a:spcBef>
+                <a:spcPct val="20000"/>
+              </a:spcBef>
+              <a:buFont typeface="Arial" pitchFamily="34" charset="0"/>
+              <a:buChar char="•"/>
+              <a:defRPr sz="2000" kern="1200">
+                <a:solidFill>
+                  <a:schemeClr val="tx1"/>
+                </a:solidFill>
+                <a:latin typeface="+mn-lt"/>
+                <a:ea typeface="+mn-ea"/>
+                <a:cs typeface="+mn-cs"/>
+              </a:defRPr>
+            </a:lvl9pPr>
+          </a:lstStyle>
+          <a:p>
+            <a:r>
+              <a:rPr lang="en-US" sz="2000" dirty="0"/>
+              <a:t>Bruit v = 0,2m/s</a:t>
+            </a:r>
+          </a:p>
+          <a:p>
+            <a:r>
+              <a:rPr lang="en-US" sz="2000" dirty="0"/>
+              <a:t>Bruit w = 2dps</a:t>
+            </a:r>
+          </a:p>
+          <a:p>
+            <a:r>
+              <a:rPr lang="en-US" sz="2000" dirty="0"/>
+              <a:t>Bias w = 0dps</a:t>
             </a:r>
           </a:p>
         </p:txBody>
@@ -5661,7 +5920,7 @@
     </p:spTree>
     <p:extLst>
       <p:ext uri="{BB962C8B-B14F-4D97-AF65-F5344CB8AC3E}">
-        <p14:creationId xmlns:p14="http://schemas.microsoft.com/office/powerpoint/2010/main" val="3761765850"/>
+        <p14:creationId xmlns:p14="http://schemas.microsoft.com/office/powerpoint/2010/main" val="1302186867"/>
       </p:ext>
     </p:extLst>
   </p:cSld>
@@ -5690,52 +5949,278 @@
       </p:grpSpPr>
       <p:sp>
         <p:nvSpPr>
-          <p:cNvPr id="2" name="Titre 1"/>
-          <p:cNvSpPr>
-            <a:spLocks noGrp="1"/>
-          </p:cNvSpPr>
-          <p:nvPr>
-            <p:ph type="ctrTitle"/>
-          </p:nvPr>
-        </p:nvSpPr>
-        <p:spPr/>
-        <p:txBody>
-          <a:bodyPr/>
-          <a:lstStyle/>
-          <a:p>
-            <a:r>
-              <a:rPr lang="fr-FR" dirty="0"/>
-              <a:t>SLAM</a:t>
-            </a:r>
-          </a:p>
-        </p:txBody>
-      </p:sp>
-      <p:sp>
-        <p:nvSpPr>
-          <p:cNvPr id="3" name="Sous-titre 2"/>
-          <p:cNvSpPr>
-            <a:spLocks noGrp="1"/>
-          </p:cNvSpPr>
-          <p:nvPr>
-            <p:ph type="subTitle" idx="1"/>
-          </p:nvPr>
-        </p:nvSpPr>
-        <p:spPr/>
-        <p:txBody>
-          <a:bodyPr/>
-          <a:lstStyle/>
-          <a:p>
-            <a:r>
-              <a:rPr lang="fr-FR" dirty="0"/>
-              <a:t>Solution &amp; Portage ROBOT</a:t>
-            </a:r>
+          <p:cNvPr id="2" name="Titre 1">
+            <a:extLst>
+              <a:ext uri="{FF2B5EF4-FFF2-40B4-BE49-F238E27FC236}">
+                <a16:creationId xmlns:a16="http://schemas.microsoft.com/office/drawing/2014/main" id="{1AC18A72-3633-44BC-9268-BA6148FA80F1}"/>
+              </a:ext>
+            </a:extLst>
+          </p:cNvPr>
+          <p:cNvSpPr>
+            <a:spLocks noGrp="1"/>
+          </p:cNvSpPr>
+          <p:nvPr>
+            <p:ph type="title"/>
+          </p:nvPr>
+        </p:nvSpPr>
+        <p:spPr/>
+        <p:txBody>
+          <a:bodyPr/>
+          <a:lstStyle/>
+          <a:p>
+            <a:r>
+              <a:rPr lang="fr-FR"/>
+              <a:t>Algorithme SLAM « maison »</a:t>
+            </a:r>
+          </a:p>
+        </p:txBody>
+      </p:sp>
+      <p:pic>
+        <p:nvPicPr>
+          <p:cNvPr id="6" name="Espace réservé du contenu 5" descr="Une image contenant texte, carte&#10;&#10;Description générée automatiquement">
+            <a:extLst>
+              <a:ext uri="{FF2B5EF4-FFF2-40B4-BE49-F238E27FC236}">
+                <a16:creationId xmlns:a16="http://schemas.microsoft.com/office/drawing/2014/main" id="{37E9737C-CF09-4E63-A703-40AAC3BD6EDE}"/>
+              </a:ext>
+            </a:extLst>
+          </p:cNvPr>
+          <p:cNvPicPr>
+            <a:picLocks noGrp="1" noChangeAspect="1"/>
+          </p:cNvPicPr>
+          <p:nvPr>
+            <p:ph idx="1"/>
+          </p:nvPr>
+        </p:nvPicPr>
+        <p:blipFill>
+          <a:blip r:embed="rId2" cstate="print">
+            <a:extLst>
+              <a:ext uri="{28A0092B-C50C-407E-A947-70E740481C1C}">
+                <a14:useLocalDpi xmlns:a14="http://schemas.microsoft.com/office/drawing/2010/main" val="0"/>
+              </a:ext>
+            </a:extLst>
+          </a:blip>
+          <a:stretch>
+            <a:fillRect/>
+          </a:stretch>
+        </p:blipFill>
+        <p:spPr>
+          <a:xfrm>
+            <a:off x="632812" y="1600200"/>
+            <a:ext cx="7878376" cy="4525963"/>
+          </a:xfrm>
+        </p:spPr>
+      </p:pic>
+      <p:sp>
+        <p:nvSpPr>
+          <p:cNvPr id="11" name="Content Placeholder 9">
+            <a:extLst>
+              <a:ext uri="{FF2B5EF4-FFF2-40B4-BE49-F238E27FC236}">
+                <a16:creationId xmlns:a16="http://schemas.microsoft.com/office/drawing/2014/main" id="{F7DED74A-2B34-4D8A-98E0-E49290C27D99}"/>
+              </a:ext>
+            </a:extLst>
+          </p:cNvPr>
+          <p:cNvSpPr txBox="1">
+            <a:spLocks/>
+          </p:cNvSpPr>
+          <p:nvPr/>
+        </p:nvSpPr>
+        <p:spPr>
+          <a:xfrm>
+            <a:off x="0" y="5715000"/>
+            <a:ext cx="4419600" cy="1143000"/>
+          </a:xfrm>
+          <a:prstGeom prst="rect">
+            <a:avLst/>
+          </a:prstGeom>
+        </p:spPr>
+        <p:txBody>
+          <a:bodyPr vert="horz" lIns="91440" tIns="45720" rIns="91440" bIns="45720" rtlCol="0">
+            <a:normAutofit/>
+          </a:bodyPr>
+          <a:lstStyle>
+            <a:lvl1pPr marL="342900" indent="-342900" algn="l" defTabSz="914400" rtl="0" eaLnBrk="1" latinLnBrk="0" hangingPunct="1">
+              <a:spcBef>
+                <a:spcPct val="20000"/>
+              </a:spcBef>
+              <a:buFont typeface="Arial" pitchFamily="34" charset="0"/>
+              <a:buChar char="•"/>
+              <a:defRPr sz="3200" kern="1200">
+                <a:solidFill>
+                  <a:schemeClr val="tx1"/>
+                </a:solidFill>
+                <a:latin typeface="+mn-lt"/>
+                <a:ea typeface="+mn-ea"/>
+                <a:cs typeface="+mn-cs"/>
+              </a:defRPr>
+            </a:lvl1pPr>
+            <a:lvl2pPr marL="742950" indent="-285750" algn="l" defTabSz="914400" rtl="0" eaLnBrk="1" latinLnBrk="0" hangingPunct="1">
+              <a:spcBef>
+                <a:spcPct val="20000"/>
+              </a:spcBef>
+              <a:buFont typeface="Arial" pitchFamily="34" charset="0"/>
+              <a:buChar char="–"/>
+              <a:defRPr sz="2800" kern="1200">
+                <a:solidFill>
+                  <a:schemeClr val="tx1"/>
+                </a:solidFill>
+                <a:latin typeface="+mn-lt"/>
+                <a:ea typeface="+mn-ea"/>
+                <a:cs typeface="+mn-cs"/>
+              </a:defRPr>
+            </a:lvl2pPr>
+            <a:lvl3pPr marL="1143000" indent="-228600" algn="l" defTabSz="914400" rtl="0" eaLnBrk="1" latinLnBrk="0" hangingPunct="1">
+              <a:spcBef>
+                <a:spcPct val="20000"/>
+              </a:spcBef>
+              <a:buFont typeface="Arial" pitchFamily="34" charset="0"/>
+              <a:buChar char="•"/>
+              <a:defRPr sz="2400" kern="1200">
+                <a:solidFill>
+                  <a:schemeClr val="tx1"/>
+                </a:solidFill>
+                <a:latin typeface="+mn-lt"/>
+                <a:ea typeface="+mn-ea"/>
+                <a:cs typeface="+mn-cs"/>
+              </a:defRPr>
+            </a:lvl3pPr>
+            <a:lvl4pPr marL="1600200" indent="-228600" algn="l" defTabSz="914400" rtl="0" eaLnBrk="1" latinLnBrk="0" hangingPunct="1">
+              <a:spcBef>
+                <a:spcPct val="20000"/>
+              </a:spcBef>
+              <a:buFont typeface="Arial" pitchFamily="34" charset="0"/>
+              <a:buChar char="–"/>
+              <a:defRPr sz="2000" kern="1200">
+                <a:solidFill>
+                  <a:schemeClr val="tx1"/>
+                </a:solidFill>
+                <a:latin typeface="+mn-lt"/>
+                <a:ea typeface="+mn-ea"/>
+                <a:cs typeface="+mn-cs"/>
+              </a:defRPr>
+            </a:lvl4pPr>
+            <a:lvl5pPr marL="2057400" indent="-228600" algn="l" defTabSz="914400" rtl="0" eaLnBrk="1" latinLnBrk="0" hangingPunct="1">
+              <a:spcBef>
+                <a:spcPct val="20000"/>
+              </a:spcBef>
+              <a:buFont typeface="Arial" pitchFamily="34" charset="0"/>
+              <a:buChar char="»"/>
+              <a:defRPr sz="2000" kern="1200">
+                <a:solidFill>
+                  <a:schemeClr val="tx1"/>
+                </a:solidFill>
+                <a:latin typeface="+mn-lt"/>
+                <a:ea typeface="+mn-ea"/>
+                <a:cs typeface="+mn-cs"/>
+              </a:defRPr>
+            </a:lvl5pPr>
+            <a:lvl6pPr marL="2514600" indent="-228600" algn="l" defTabSz="914400" rtl="0" eaLnBrk="1" latinLnBrk="0" hangingPunct="1">
+              <a:spcBef>
+                <a:spcPct val="20000"/>
+              </a:spcBef>
+              <a:buFont typeface="Arial" pitchFamily="34" charset="0"/>
+              <a:buChar char="•"/>
+              <a:defRPr sz="2000" kern="1200">
+                <a:solidFill>
+                  <a:schemeClr val="tx1"/>
+                </a:solidFill>
+                <a:latin typeface="+mn-lt"/>
+                <a:ea typeface="+mn-ea"/>
+                <a:cs typeface="+mn-cs"/>
+              </a:defRPr>
+            </a:lvl6pPr>
+            <a:lvl7pPr marL="2971800" indent="-228600" algn="l" defTabSz="914400" rtl="0" eaLnBrk="1" latinLnBrk="0" hangingPunct="1">
+              <a:spcBef>
+                <a:spcPct val="20000"/>
+              </a:spcBef>
+              <a:buFont typeface="Arial" pitchFamily="34" charset="0"/>
+              <a:buChar char="•"/>
+              <a:defRPr sz="2000" kern="1200">
+                <a:solidFill>
+                  <a:schemeClr val="tx1"/>
+                </a:solidFill>
+                <a:latin typeface="+mn-lt"/>
+                <a:ea typeface="+mn-ea"/>
+                <a:cs typeface="+mn-cs"/>
+              </a:defRPr>
+            </a:lvl7pPr>
+            <a:lvl8pPr marL="3429000" indent="-228600" algn="l" defTabSz="914400" rtl="0" eaLnBrk="1" latinLnBrk="0" hangingPunct="1">
+              <a:spcBef>
+                <a:spcPct val="20000"/>
+              </a:spcBef>
+              <a:buFont typeface="Arial" pitchFamily="34" charset="0"/>
+              <a:buChar char="•"/>
+              <a:defRPr sz="2000" kern="1200">
+                <a:solidFill>
+                  <a:schemeClr val="tx1"/>
+                </a:solidFill>
+                <a:latin typeface="+mn-lt"/>
+                <a:ea typeface="+mn-ea"/>
+                <a:cs typeface="+mn-cs"/>
+              </a:defRPr>
+            </a:lvl8pPr>
+            <a:lvl9pPr marL="3886200" indent="-228600" algn="l" defTabSz="914400" rtl="0" eaLnBrk="1" latinLnBrk="0" hangingPunct="1">
+              <a:spcBef>
+                <a:spcPct val="20000"/>
+              </a:spcBef>
+              <a:buFont typeface="Arial" pitchFamily="34" charset="0"/>
+              <a:buChar char="•"/>
+              <a:defRPr sz="2000" kern="1200">
+                <a:solidFill>
+                  <a:schemeClr val="tx1"/>
+                </a:solidFill>
+                <a:latin typeface="+mn-lt"/>
+                <a:ea typeface="+mn-ea"/>
+                <a:cs typeface="+mn-cs"/>
+              </a:defRPr>
+            </a:lvl9pPr>
+          </a:lstStyle>
+          <a:p>
+            <a:r>
+              <a:rPr lang="en-US" sz="2000" dirty="0"/>
+              <a:t>Bruit v = 0,2m/s (blanc)</a:t>
+            </a:r>
+          </a:p>
+          <a:p>
+            <a:r>
+              <a:rPr lang="en-US" sz="2000" dirty="0"/>
+              <a:t>Bruit w = 2dps (blanc)</a:t>
+            </a:r>
+          </a:p>
+          <a:p>
+            <a:r>
+              <a:rPr lang="en-US" sz="2000" dirty="0"/>
+              <a:t>Bias w = 0,1dps </a:t>
+            </a:r>
+            <a:r>
+              <a:rPr lang="en-US" sz="2000" dirty="0">
+                <a:solidFill>
+                  <a:srgbClr val="FF0000"/>
+                </a:solidFill>
+                <a:sym typeface="Wingdings" panose="05000000000000000000" pitchFamily="2" charset="2"/>
+              </a:rPr>
+              <a:t> </a:t>
+            </a:r>
+            <a:r>
+              <a:rPr lang="en-US" sz="2000" dirty="0" err="1">
+                <a:solidFill>
+                  <a:srgbClr val="FF0000"/>
+                </a:solidFill>
+                <a:sym typeface="Wingdings" panose="05000000000000000000" pitchFamily="2" charset="2"/>
+              </a:rPr>
+              <a:t>Décrochage</a:t>
+            </a:r>
+            <a:endParaRPr lang="en-US" sz="2000" dirty="0">
+              <a:solidFill>
+                <a:srgbClr val="FF0000"/>
+              </a:solidFill>
+            </a:endParaRPr>
           </a:p>
         </p:txBody>
       </p:sp>
     </p:spTree>
     <p:extLst>
       <p:ext uri="{BB962C8B-B14F-4D97-AF65-F5344CB8AC3E}">
-        <p14:creationId xmlns:p14="http://schemas.microsoft.com/office/powerpoint/2010/main" val="207348330"/>
+        <p14:creationId xmlns:p14="http://schemas.microsoft.com/office/powerpoint/2010/main" val="94695125"/>
       </p:ext>
     </p:extLst>
   </p:cSld>
@@ -5779,7 +6264,7 @@
           <a:p>
             <a:r>
               <a:rPr lang="fr-FR" dirty="0"/>
-              <a:t>SLAM</a:t>
+              <a:t>Algorithme SLAM « maison »</a:t>
             </a:r>
           </a:p>
         </p:txBody>
@@ -5796,46 +6281,160 @@
         </p:nvSpPr>
         <p:spPr/>
         <p:txBody>
-          <a:bodyPr/>
-          <a:lstStyle/>
-          <a:p>
-            <a:r>
-              <a:rPr lang="fr-FR" dirty="0"/>
-              <a:t>EKF-SLAM (</a:t>
+          <a:bodyPr>
+            <a:normAutofit fontScale="70000" lnSpcReduction="20000"/>
+          </a:bodyPr>
+          <a:lstStyle/>
+          <a:p>
+            <a:r>
+              <a:rPr lang="fr-FR" dirty="0"/>
+              <a:t>Limitations  &amp; Problèmes</a:t>
+            </a:r>
+          </a:p>
+          <a:p>
+            <a:pPr lvl="1"/>
+            <a:r>
+              <a:rPr lang="fr-FR" dirty="0">
+                <a:solidFill>
+                  <a:srgbClr val="FF0000"/>
+                </a:solidFill>
+              </a:rPr>
+              <a:t>Pouvoir de compensation du BIAS limité</a:t>
+            </a:r>
+          </a:p>
+          <a:p>
+            <a:pPr lvl="1"/>
+            <a:r>
+              <a:rPr lang="fr-FR" dirty="0">
+                <a:solidFill>
+                  <a:srgbClr val="FF0000"/>
+                </a:solidFill>
+              </a:rPr>
+              <a:t>Pas d’algorithme de fermeture de boucle </a:t>
+            </a:r>
+          </a:p>
+          <a:p>
+            <a:pPr lvl="1"/>
+            <a:r>
+              <a:rPr lang="fr-FR" dirty="0">
+                <a:solidFill>
+                  <a:srgbClr val="FF0000"/>
+                </a:solidFill>
+              </a:rPr>
+              <a:t>Temps de calcul </a:t>
+            </a:r>
+            <a:r>
+              <a:rPr lang="fr-FR" dirty="0">
+                <a:solidFill>
+                  <a:srgbClr val="FF0000"/>
+                </a:solidFill>
+                <a:sym typeface="Wingdings" panose="05000000000000000000" pitchFamily="2" charset="2"/>
+              </a:rPr>
+              <a:t> VECTORISER/SIMPLIFIER</a:t>
+            </a:r>
+          </a:p>
+          <a:p>
+            <a:pPr lvl="1"/>
+            <a:endParaRPr lang="fr-FR" dirty="0"/>
+          </a:p>
+          <a:p>
+            <a:r>
+              <a:rPr lang="fr-FR" dirty="0"/>
+              <a:t>Améliorations :</a:t>
+            </a:r>
+          </a:p>
+          <a:p>
+            <a:pPr lvl="1"/>
+            <a:r>
+              <a:rPr lang="fr-FR" dirty="0">
+                <a:solidFill>
+                  <a:srgbClr val="FF0000"/>
+                </a:solidFill>
+              </a:rPr>
+              <a:t>Moduler le champs de particules en fonction de l’erreur précédente</a:t>
+            </a:r>
+          </a:p>
+          <a:p>
+            <a:pPr lvl="1"/>
+            <a:r>
+              <a:rPr lang="fr-FR" dirty="0">
+                <a:solidFill>
+                  <a:srgbClr val="FF0000"/>
+                </a:solidFill>
+              </a:rPr>
+              <a:t>Verrouiller la carte dans le temps</a:t>
+            </a:r>
+            <a:endParaRPr lang="fr-FR" dirty="0">
+              <a:solidFill>
+                <a:srgbClr val="FF0000"/>
+              </a:solidFill>
+              <a:sym typeface="Wingdings" panose="05000000000000000000" pitchFamily="2" charset="2"/>
+            </a:endParaRPr>
+          </a:p>
+          <a:p>
+            <a:pPr lvl="1"/>
+            <a:r>
+              <a:rPr lang="fr-FR" dirty="0"/>
+              <a:t>Ajouter une fermeture de boucle </a:t>
+            </a:r>
+          </a:p>
+          <a:p>
+            <a:pPr lvl="2"/>
+            <a:r>
+              <a:rPr lang="fr-FR" dirty="0"/>
+              <a:t>Détection de la fermeture de boucle (</a:t>
             </a:r>
             <a:r>
               <a:rPr lang="fr-FR" dirty="0" err="1"/>
-              <a:t>Kalman</a:t>
-            </a:r>
-            <a:r>
-              <a:rPr lang="fr-FR" dirty="0"/>
-              <a:t> </a:t>
+              <a:t>x,y,h</a:t>
+            </a:r>
+            <a:r>
+              <a:rPr lang="fr-FR" dirty="0"/>
+              <a:t>)t1 == (</a:t>
             </a:r>
             <a:r>
               <a:rPr lang="fr-FR" dirty="0" err="1"/>
-              <a:t>Filter</a:t>
-            </a:r>
-            <a:r>
-              <a:rPr lang="fr-FR" dirty="0"/>
-              <a:t>)</a:t>
-            </a:r>
-          </a:p>
-          <a:p>
-            <a:r>
-              <a:rPr lang="fr-FR" dirty="0"/>
-              <a:t>FAST-SLAM 1,0 et 2,0 (particules)</a:t>
-            </a:r>
-          </a:p>
-          <a:p>
-            <a:r>
-              <a:rPr lang="fr-FR" dirty="0"/>
-              <a:t>Optical-SLAM…</a:t>
-            </a:r>
-          </a:p>
-          <a:p>
-            <a:r>
-              <a:rPr lang="fr-FR" dirty="0"/>
-              <a:t>Autres ?</a:t>
+              <a:t>x,y,h</a:t>
+            </a:r>
+            <a:r>
+              <a:rPr lang="fr-FR" dirty="0"/>
+              <a:t>)t2, t1&lt;&gt;t2</a:t>
+            </a:r>
+          </a:p>
+          <a:p>
+            <a:pPr lvl="2"/>
+            <a:r>
+              <a:rPr lang="fr-FR" dirty="0"/>
+              <a:t>Scruter l’évolution de la carte suite à la fermeture </a:t>
+            </a:r>
+            <a:r>
+              <a:rPr lang="fr-FR" dirty="0">
+                <a:sym typeface="Wingdings" panose="05000000000000000000" pitchFamily="2" charset="2"/>
+              </a:rPr>
+              <a:t> détection d’anomalie</a:t>
+            </a:r>
+            <a:endParaRPr lang="fr-FR" dirty="0"/>
+          </a:p>
+          <a:p>
+            <a:pPr lvl="1"/>
+            <a:r>
+              <a:rPr lang="fr-FR" dirty="0"/>
+              <a:t>Réjection des obstacles fugitifs / mobiles</a:t>
+            </a:r>
+          </a:p>
+          <a:p>
+            <a:pPr lvl="2"/>
+            <a:r>
+              <a:rPr lang="fr-FR" dirty="0"/>
+              <a:t>Estimation de la fiabilité et/ou de l’espérance de vie des ‘</a:t>
+            </a:r>
+            <a:r>
+              <a:rPr lang="fr-FR" dirty="0" err="1"/>
+              <a:t>landmarks</a:t>
+            </a:r>
+            <a:r>
+              <a:rPr lang="fr-FR" dirty="0"/>
+              <a:t>’</a:t>
             </a:r>
           </a:p>
         </p:txBody>
@@ -5843,7 +6442,7 @@
     </p:spTree>
     <p:extLst>
       <p:ext uri="{BB962C8B-B14F-4D97-AF65-F5344CB8AC3E}">
-        <p14:creationId xmlns:p14="http://schemas.microsoft.com/office/powerpoint/2010/main" val="332629115"/>
+        <p14:creationId xmlns:p14="http://schemas.microsoft.com/office/powerpoint/2010/main" val="3761765850"/>
       </p:ext>
     </p:extLst>
   </p:cSld>
@@ -5887,6 +6486,188 @@
           <a:p>
             <a:r>
               <a:rPr lang="fr-FR" dirty="0"/>
+              <a:t>SLAM</a:t>
+            </a:r>
+          </a:p>
+        </p:txBody>
+      </p:sp>
+      <p:sp>
+        <p:nvSpPr>
+          <p:cNvPr id="3" name="Sous-titre 2"/>
+          <p:cNvSpPr>
+            <a:spLocks noGrp="1"/>
+          </p:cNvSpPr>
+          <p:nvPr>
+            <p:ph type="subTitle" idx="1"/>
+          </p:nvPr>
+        </p:nvSpPr>
+        <p:spPr/>
+        <p:txBody>
+          <a:bodyPr/>
+          <a:lstStyle/>
+          <a:p>
+            <a:r>
+              <a:rPr lang="fr-FR" dirty="0"/>
+              <a:t>Solution &amp; Portage ROBOT</a:t>
+            </a:r>
+          </a:p>
+        </p:txBody>
+      </p:sp>
+    </p:spTree>
+    <p:extLst>
+      <p:ext uri="{BB962C8B-B14F-4D97-AF65-F5344CB8AC3E}">
+        <p14:creationId xmlns:p14="http://schemas.microsoft.com/office/powerpoint/2010/main" val="207348330"/>
+      </p:ext>
+    </p:extLst>
+  </p:cSld>
+  <p:clrMapOvr>
+    <a:masterClrMapping/>
+  </p:clrMapOvr>
+</p:sld>
+</file>
+
+<file path=ppt/slides/slide26.xml><?xml version="1.0" encoding="utf-8"?>
+<p:sld xmlns:a="http://schemas.openxmlformats.org/drawingml/2006/main" xmlns:r="http://schemas.openxmlformats.org/officeDocument/2006/relationships" xmlns:p="http://schemas.openxmlformats.org/presentationml/2006/main">
+  <p:cSld>
+    <p:spTree>
+      <p:nvGrpSpPr>
+        <p:cNvPr id="1" name=""/>
+        <p:cNvGrpSpPr/>
+        <p:nvPr/>
+      </p:nvGrpSpPr>
+      <p:grpSpPr>
+        <a:xfrm>
+          <a:off x="0" y="0"/>
+          <a:ext cx="0" cy="0"/>
+          <a:chOff x="0" y="0"/>
+          <a:chExt cx="0" cy="0"/>
+        </a:xfrm>
+      </p:grpSpPr>
+      <p:sp>
+        <p:nvSpPr>
+          <p:cNvPr id="2" name="Titre 1"/>
+          <p:cNvSpPr>
+            <a:spLocks noGrp="1"/>
+          </p:cNvSpPr>
+          <p:nvPr>
+            <p:ph type="title"/>
+          </p:nvPr>
+        </p:nvSpPr>
+        <p:spPr/>
+        <p:txBody>
+          <a:bodyPr/>
+          <a:lstStyle/>
+          <a:p>
+            <a:r>
+              <a:rPr lang="fr-FR" dirty="0"/>
+              <a:t>SLAM</a:t>
+            </a:r>
+          </a:p>
+        </p:txBody>
+      </p:sp>
+      <p:sp>
+        <p:nvSpPr>
+          <p:cNvPr id="3" name="Espace réservé du contenu 2"/>
+          <p:cNvSpPr>
+            <a:spLocks noGrp="1"/>
+          </p:cNvSpPr>
+          <p:nvPr>
+            <p:ph idx="1"/>
+          </p:nvPr>
+        </p:nvSpPr>
+        <p:spPr/>
+        <p:txBody>
+          <a:bodyPr/>
+          <a:lstStyle/>
+          <a:p>
+            <a:r>
+              <a:rPr lang="fr-FR" dirty="0"/>
+              <a:t>EKF-SLAM (</a:t>
+            </a:r>
+            <a:r>
+              <a:rPr lang="fr-FR" dirty="0" err="1"/>
+              <a:t>Kalman</a:t>
+            </a:r>
+            <a:r>
+              <a:rPr lang="fr-FR" dirty="0"/>
+              <a:t> </a:t>
+            </a:r>
+            <a:r>
+              <a:rPr lang="fr-FR" dirty="0" err="1"/>
+              <a:t>Filter</a:t>
+            </a:r>
+            <a:r>
+              <a:rPr lang="fr-FR" dirty="0"/>
+              <a:t>)</a:t>
+            </a:r>
+          </a:p>
+          <a:p>
+            <a:r>
+              <a:rPr lang="fr-FR" dirty="0"/>
+              <a:t>FAST-SLAM 1,0 et 2,0 (particules)</a:t>
+            </a:r>
+          </a:p>
+          <a:p>
+            <a:r>
+              <a:rPr lang="fr-FR" dirty="0"/>
+              <a:t>Optical-SLAM…</a:t>
+            </a:r>
+          </a:p>
+          <a:p>
+            <a:r>
+              <a:rPr lang="fr-FR" dirty="0"/>
+              <a:t>Autres ?</a:t>
+            </a:r>
+          </a:p>
+        </p:txBody>
+      </p:sp>
+    </p:spTree>
+    <p:extLst>
+      <p:ext uri="{BB962C8B-B14F-4D97-AF65-F5344CB8AC3E}">
+        <p14:creationId xmlns:p14="http://schemas.microsoft.com/office/powerpoint/2010/main" val="332629115"/>
+      </p:ext>
+    </p:extLst>
+  </p:cSld>
+  <p:clrMapOvr>
+    <a:masterClrMapping/>
+  </p:clrMapOvr>
+</p:sld>
+</file>
+
+<file path=ppt/slides/slide27.xml><?xml version="1.0" encoding="utf-8"?>
+<p:sld xmlns:a="http://schemas.openxmlformats.org/drawingml/2006/main" xmlns:r="http://schemas.openxmlformats.org/officeDocument/2006/relationships" xmlns:p="http://schemas.openxmlformats.org/presentationml/2006/main">
+  <p:cSld>
+    <p:spTree>
+      <p:nvGrpSpPr>
+        <p:cNvPr id="1" name=""/>
+        <p:cNvGrpSpPr/>
+        <p:nvPr/>
+      </p:nvGrpSpPr>
+      <p:grpSpPr>
+        <a:xfrm>
+          <a:off x="0" y="0"/>
+          <a:ext cx="0" cy="0"/>
+          <a:chOff x="0" y="0"/>
+          <a:chExt cx="0" cy="0"/>
+        </a:xfrm>
+      </p:grpSpPr>
+      <p:sp>
+        <p:nvSpPr>
+          <p:cNvPr id="2" name="Titre 1"/>
+          <p:cNvSpPr>
+            <a:spLocks noGrp="1"/>
+          </p:cNvSpPr>
+          <p:nvPr>
+            <p:ph type="ctrTitle"/>
+          </p:nvPr>
+        </p:nvSpPr>
+        <p:spPr/>
+        <p:txBody>
+          <a:bodyPr/>
+          <a:lstStyle/>
+          <a:p>
+            <a:r>
+              <a:rPr lang="fr-FR" dirty="0"/>
               <a:t>Suite</a:t>
             </a:r>
           </a:p>
@@ -5924,7 +6705,7 @@
 </p:sld>
 </file>
 
-<file path=ppt/slides/slide26.xml><?xml version="1.0" encoding="utf-8"?>
+<file path=ppt/slides/slide28.xml><?xml version="1.0" encoding="utf-8"?>
 <p:sld xmlns:a="http://schemas.openxmlformats.org/drawingml/2006/main" xmlns:r="http://schemas.openxmlformats.org/officeDocument/2006/relationships" xmlns:p="http://schemas.openxmlformats.org/presentationml/2006/main">
   <p:cSld>
     <p:spTree>

</xml_diff>